<commit_message>
Changing conversion to class-based converter
</commit_message>
<xml_diff>
--- a/py_convert/ONE_DATA/Oneida_slides_unicode.pptx
+++ b/py_convert/ONE_DATA/Oneida_slides_unicode.pptx
@@ -1742,9 +1742,9 @@
             <a:pPr algn="ctr"/>
             <a:r>
               <a:rPr b="0" lang="en-US" sz="5400" spc="-1" strike="noStrike">
-                <a:latin typeface="NotoSans-Regular"/>
-              </a:rPr>
-              <a:t>U</a:t>
+                <a:latin typeface="Times New Roman"/>
+              </a:rPr>
+              <a:t>Ukwehokú</a:t>
             </a:r>
             <a:r>
               <a:rPr b="0" lang="en-US" sz="5400" spc="-1" strike="noStrike" u="sng">
@@ -1752,7 +1752,7 @@
                   <a:srgbClr val="000000"/>
                 </a:solidFill>
                 <a:uFillTx/>
-                <a:latin typeface="NotoSans-Regular"/>
+                <a:latin typeface="Times New Roman"/>
                 <a:ea typeface=""/>
               </a:rPr>
               <a:t>ha</a:t>
@@ -1789,38 +1789,38 @@
             <a:pPr algn="ctr"/>
             <a:r>
               <a:rPr b="0" i="1" lang="en-US" sz="3200" spc="-1" strike="noStrike">
-                <a:latin typeface="NotoSans-Regular"/>
+                <a:latin typeface="Times New Roman"/>
                 <a:ea typeface="Noto Sans CJK SC Regular"/>
               </a:rPr>
-              <a:t>T</a:t>
+              <a:t>Ta· </a:t>
             </a:r>
             <a:r>
               <a:rPr b="0" i="1" lang="en-US" sz="3200" spc="-1" strike="noStrike">
-                <a:latin typeface="NotoSans-Regular"/>
+                <a:latin typeface="Times New Roman"/>
                 <a:ea typeface="Noto Sans CJK SC Regular"/>
               </a:rPr>
-              <a:t>a</a:t>
+              <a:t>aeswatahuhsiyósteʔ</a:t>
             </a:r>
             <a:r>
               <a:rPr b="0" i="1" lang="en-US" sz="3200" spc="-1" strike="noStrike">
-                <a:latin typeface="NotoSans-Regular"/>
+                <a:latin typeface="Times New Roman"/>
                 <a:ea typeface="Noto Sans CJK SC Regular"/>
               </a:rPr>
-              <a:t> </a:t>
+              <a:t> o·nʌ̀ tsiʔ náhteʔ ohʌ·tú </a:t>
             </a:r>
             <a:r>
               <a:rPr b="0" i="1" lang="en-US" sz="3200" spc="-1" strike="noStrike">
                 <a:solidFill>
                   <a:srgbClr val="5565af"/>
                 </a:solidFill>
-                <a:latin typeface="NotoSans-Regular"/>
+                <a:latin typeface="Times New Roman"/>
                 <a:ea typeface="Noto Sans CJK SC Regular"/>
               </a:rPr>
-              <a:t>y</a:t>
+              <a:t>yolihwatéhtuʔ</a:t>
             </a:r>
             <a:r>
               <a:rPr b="0" i="1" lang="en-US" sz="3200" spc="-1" strike="noStrike">
-                <a:latin typeface="NotoSans-Regular"/>
+                <a:latin typeface="Times New Roman"/>
                 <a:ea typeface="Noto Sans CJK SC Regular"/>
               </a:rPr>
               <a:t> </a:t>
@@ -1928,18 +1928,18 @@
             <a:pPr algn="ctr"/>
             <a:r>
               <a:rPr b="0" lang="en-US" sz="4800" spc="-1" strike="noStrike">
-                <a:latin typeface="NotoSans-Regular"/>
+                <a:latin typeface="Times New Roman"/>
                 <a:ea typeface="Noto Sans CJK SC Regular"/>
               </a:rPr>
-              <a:t>L</a:t>
+              <a:t>Lotihsóthaʔ Latihsakayu·téhs</a:t>
             </a:r>
             <a:r>
               <a:rPr b="0" lang="en-US" sz="4800" spc="-1" strike="noStrike" u="sng">
                 <a:uFillTx/>
-                <a:latin typeface="NotoSans-Regular"/>
+                <a:latin typeface="Times New Roman"/>
                 <a:ea typeface="Noto Sans CJK SC Regular"/>
               </a:rPr>
-              <a:t>e</a:t>
+              <a:t>eʔ</a:t>
             </a:r>
             <a:endParaRPr b="0" lang="en-US" sz="4800" spc="-1" strike="noStrike">
               <a:latin typeface="Oneida"/>
@@ -1973,9 +1973,9 @@
           <a:p>
             <a:r>
               <a:rPr b="0" lang="en-US" sz="1600" spc="-1" strike="noStrike">
-                <a:latin typeface="NotoSans-Regular"/>
-              </a:rPr>
-              <a:t>T</a:t>
+                <a:latin typeface="Times New Roman"/>
+              </a:rPr>
+              <a:t>Ta· aeswélhekeʔ kʌtyókwaʔ né· tho niyo·lé· waʔkkwe·ní· né· kanehelatúksla.</a:t>
             </a:r>
             <a:endParaRPr b="0" lang="en-US" sz="1600" spc="-1" strike="noStrike">
               <a:latin typeface="Oneida"/>
@@ -1984,16 +1984,16 @@
           <a:p>
             <a:r>
               <a:rPr b="0" lang="en-US" sz="1600" spc="-1" strike="noStrike">
-                <a:latin typeface="NotoSans-Regular"/>
-              </a:rPr>
-              <a:t>N</a:t>
+                <a:latin typeface="Times New Roman"/>
+              </a:rPr>
+              <a:t>Né· katsaʔ ok nu· tukwató·ktʌ né· waʔtkatʌ̀·nukeʔ né· ʌskwatílhekeʔ né· tho niyo·lé waʔkkwe·ní· né· elhúwa wakewyʌtethaʔuhátyehseʔ né· kanʌ̀·laku akata·t</a:t>
             </a:r>
             <a:r>
               <a:rPr b="0" lang="en-US" sz="1600" spc="-1" strike="noStrike" u="sng">
                 <a:uFillTx/>
-                <a:latin typeface="NotoSans-Regular"/>
-              </a:rPr>
-              <a:t>í</a:t>
+                <a:latin typeface="Times New Roman"/>
+              </a:rPr>
+              <a:t>í·</a:t>
             </a:r>
             <a:endParaRPr b="0" lang="en-US" sz="1600" spc="-1" strike="noStrike">
               <a:latin typeface="Oneida"/>
@@ -2002,22 +2002,22 @@
           <a:p>
             <a:r>
               <a:rPr b="0" lang="en-US" sz="1600" spc="-1" strike="noStrike">
-                <a:latin typeface="NotoSans-Regular"/>
-              </a:rPr>
-              <a:t>T</a:t>
+                <a:latin typeface="Times New Roman"/>
+              </a:rPr>
+              <a:t>Ta· tho niyohtúhak né· yukwaʔnikúhl</a:t>
             </a:r>
             <a:r>
               <a:rPr b="0" lang="en-US" sz="1600" spc="-1" strike="noStrike" u="sng">
                 <a:uFillTx/>
-                <a:latin typeface="NotoSans-Regular"/>
+                <a:latin typeface="Times New Roman"/>
               </a:rPr>
               <a:t>a?</a:t>
             </a:r>
             <a:r>
               <a:rPr b="0" lang="en-US" sz="1600" spc="-1" strike="noStrike">
-                <a:latin typeface="NotoSans-Regular"/>
-              </a:rPr>
-              <a:t>.</a:t>
+                <a:latin typeface="Times New Roman"/>
+              </a:rPr>
+              <a:t>.  Táneʔ tho.</a:t>
             </a:r>
             <a:endParaRPr b="0" lang="en-US" sz="1600" spc="-1" strike="noStrike">
               <a:latin typeface="Oneida"/>

</xml_diff>